<commit_message>
day 3 content update
</commit_message>
<xml_diff>
--- a/AdvancedRxSwift/day3/AdvancedRxSwift3.pptx
+++ b/AdvancedRxSwift/day3/AdvancedRxSwift3.pptx
@@ -7623,13 +7623,54 @@
               </a:rPr>
               <a:t>    </a:t>
             </a:r>
-          </a:p>
-          <a:p>
             <a:r>
               <a:rPr lang="en-US" sz="1200" dirty="0">
                 <a:latin typeface="Courier"/>
                 <a:cs typeface="Courier"/>
               </a:rPr>
+              <a:t>let </a:t>
+            </a:r>
+            <a:r>
+              <a:rPr lang="en-US" sz="1200" dirty="0" err="1">
+                <a:latin typeface="Courier"/>
+                <a:cs typeface="Courier"/>
+              </a:rPr>
+              <a:t>viewModel</a:t>
+            </a:r>
+            <a:r>
+              <a:rPr lang="en-US" sz="1200" dirty="0">
+                <a:latin typeface="Courier"/>
+                <a:cs typeface="Courier"/>
+              </a:rPr>
+              <a:t> = </a:t>
+            </a:r>
+            <a:r>
+              <a:rPr lang="en-US" sz="1200" dirty="0" err="1">
+                <a:latin typeface="Courier"/>
+                <a:cs typeface="Courier"/>
+              </a:rPr>
+              <a:t>SimpleViewModel</a:t>
+            </a:r>
+            <a:r>
+              <a:rPr lang="en-US" sz="1200" dirty="0">
+                <a:latin typeface="Courier"/>
+                <a:cs typeface="Courier"/>
+              </a:rPr>
+              <a:t>()</a:t>
+            </a:r>
+          </a:p>
+          <a:p>
+            <a:endParaRPr lang="mr-IN" sz="1200" dirty="0">
+              <a:latin typeface="Courier"/>
+              <a:cs typeface="Courier"/>
+            </a:endParaRPr>
+          </a:p>
+          <a:p>
+            <a:r>
+              <a:rPr lang="en-US" sz="1200" dirty="0">
+                <a:latin typeface="Courier"/>
+                <a:cs typeface="Courier"/>
+              </a:rPr>
               <a:t>    override </a:t>
             </a:r>
             <a:r>
@@ -7699,45 +7740,19 @@
                 <a:latin typeface="Courier"/>
                 <a:cs typeface="Courier"/>
               </a:rPr>
-              <a:t>        let </a:t>
-            </a:r>
-            <a:r>
-              <a:rPr lang="en-US" sz="1200" dirty="0" err="1">
-                <a:latin typeface="Courier"/>
-                <a:cs typeface="Courier"/>
-              </a:rPr>
-              <a:t>viewModel</a:t>
-            </a:r>
-            <a:r>
-              <a:rPr lang="en-US" sz="1200" dirty="0">
-                <a:latin typeface="Courier"/>
-                <a:cs typeface="Courier"/>
-              </a:rPr>
-              <a:t> = </a:t>
-            </a:r>
-            <a:r>
-              <a:rPr lang="en-US" sz="1200" dirty="0" err="1">
-                <a:latin typeface="Courier"/>
-                <a:cs typeface="Courier"/>
-              </a:rPr>
-              <a:t>SimpleViewModel</a:t>
-            </a:r>
-            <a:r>
-              <a:rPr lang="en-US" sz="1200" dirty="0">
-                <a:latin typeface="Courier"/>
-                <a:cs typeface="Courier"/>
-              </a:rPr>
-              <a:t>()</a:t>
-            </a:r>
-          </a:p>
-          <a:p>
-            <a:r>
-              <a:rPr lang="mr-IN" sz="1200" dirty="0">
-                <a:latin typeface="Courier"/>
-                <a:cs typeface="Courier"/>
-              </a:rPr>
               <a:t>        </a:t>
             </a:r>
+            <a:r>
+              <a:rPr lang="mr-IN" sz="1200" dirty="0" smtClean="0">
+                <a:latin typeface="Courier"/>
+                <a:cs typeface="Courier"/>
+              </a:rPr>
+              <a:t>        </a:t>
+            </a:r>
+            <a:endParaRPr lang="mr-IN" sz="1200" dirty="0">
+              <a:latin typeface="Courier"/>
+              <a:cs typeface="Courier"/>
+            </a:endParaRPr>
           </a:p>
           <a:p>
             <a:r>
@@ -8049,7 +8064,7 @@
         <p:spPr>
           <a:xfrm>
             <a:off x="303536" y="1465340"/>
-            <a:ext cx="7149054" cy="2739211"/>
+            <a:ext cx="7149054" cy="3508652"/>
           </a:xfrm>
           <a:prstGeom prst="rect">
             <a:avLst/>
@@ -8171,42 +8186,228 @@
                 <a:latin typeface="Courier"/>
                 <a:cs typeface="Courier"/>
               </a:rPr>
-              <a:t>            .drive(onNext: { </a:t>
+              <a:t>            .drive(onNext: { [weak self] _ in</a:t>
+            </a:r>
+          </a:p>
+          <a:p>
+            <a:r>
+              <a:rPr lang="en-US" sz="1200" dirty="0">
+                <a:latin typeface="Courier"/>
+                <a:cs typeface="Courier"/>
+              </a:rPr>
+              <a:t>                self?.</a:t>
+            </a:r>
+            <a:r>
+              <a:rPr lang="en-US" sz="1200" dirty="0" err="1">
+                <a:latin typeface="Courier"/>
+                <a:cs typeface="Courier"/>
+              </a:rPr>
+              <a:t>activityButtonAction</a:t>
+            </a:r>
+            <a:r>
+              <a:rPr lang="en-US" sz="1200" dirty="0">
+                <a:latin typeface="Courier"/>
+                <a:cs typeface="Courier"/>
+              </a:rPr>
+              <a:t>()</a:t>
+            </a:r>
+          </a:p>
+          <a:p>
+            <a:r>
+              <a:rPr lang="mr-IN" sz="1200" dirty="0">
+                <a:latin typeface="Courier"/>
+                <a:cs typeface="Courier"/>
+              </a:rPr>
+              <a:t>            }).disposed(by: disposeBag)</a:t>
+            </a:r>
+            <a:endParaRPr lang="mr-IN" sz="1200" dirty="0">
+              <a:latin typeface="Courier"/>
+              <a:cs typeface="Courier"/>
+            </a:endParaRPr>
+          </a:p>
+          <a:p>
+            <a:r>
+              <a:rPr lang="mr-IN" sz="1200" dirty="0">
+                <a:latin typeface="Courier"/>
+                <a:cs typeface="Courier"/>
+              </a:rPr>
+              <a:t>    </a:t>
+            </a:r>
+            <a:r>
+              <a:rPr lang="mr-IN" sz="1200" dirty="0" smtClean="0">
+                <a:latin typeface="Courier"/>
+                <a:cs typeface="Courier"/>
+              </a:rPr>
+              <a:t>}</a:t>
+            </a:r>
+            <a:endParaRPr lang="en-CA" sz="1200" dirty="0" smtClean="0">
+              <a:latin typeface="Courier"/>
+              <a:cs typeface="Courier"/>
+            </a:endParaRPr>
+          </a:p>
+          <a:p>
+            <a:endParaRPr lang="en-CA" sz="1200" dirty="0">
+              <a:latin typeface="Courier"/>
+              <a:cs typeface="Courier"/>
+            </a:endParaRPr>
+          </a:p>
+          <a:p>
+            <a:r>
+              <a:rPr lang="en-US" sz="1200" dirty="0">
+                <a:latin typeface="Courier"/>
+                <a:cs typeface="Courier"/>
+              </a:rPr>
+              <a:t> </a:t>
             </a:r>
             <a:r>
               <a:rPr lang="en-US" sz="1200" dirty="0" smtClean="0">
                 <a:latin typeface="Courier"/>
                 <a:cs typeface="Courier"/>
               </a:rPr>
-              <a:t>[</a:t>
+              <a:t>   </a:t>
             </a:r>
             <a:r>
               <a:rPr lang="en-US" sz="1200" dirty="0" err="1" smtClean="0">
                 <a:latin typeface="Courier"/>
                 <a:cs typeface="Courier"/>
               </a:rPr>
-              <a:t>unowned</a:t>
-            </a:r>
-            <a:r>
-              <a:rPr lang="en-US" sz="1200" smtClean="0">
-                <a:latin typeface="Courier"/>
-                <a:cs typeface="Courier"/>
-              </a:rPr>
-              <a:t> self] </a:t>
-            </a:r>
-            <a:r>
-              <a:rPr lang="mr-IN" sz="1200" smtClean="0">
-                <a:latin typeface="Courier"/>
-                <a:cs typeface="Courier"/>
-              </a:rPr>
-              <a:t>_ </a:t>
-            </a:r>
+              <a:t>func</a:t>
+            </a:r>
+            <a:r>
+              <a:rPr lang="en-US" sz="1200" dirty="0" smtClean="0">
+                <a:latin typeface="Courier"/>
+                <a:cs typeface="Courier"/>
+              </a:rPr>
+              <a:t> </a:t>
+            </a:r>
+            <a:r>
+              <a:rPr lang="en-US" sz="1200" dirty="0" err="1">
+                <a:latin typeface="Courier"/>
+                <a:cs typeface="Courier"/>
+              </a:rPr>
+              <a:t>activityButtonAction</a:t>
+            </a:r>
+            <a:r>
+              <a:rPr lang="en-US" sz="1200" dirty="0">
+                <a:latin typeface="Courier"/>
+                <a:cs typeface="Courier"/>
+              </a:rPr>
+              <a:t>() {</a:t>
+            </a:r>
+          </a:p>
+          <a:p>
+            <a:r>
+              <a:rPr lang="en-US" sz="1200" dirty="0">
+                <a:latin typeface="Courier"/>
+                <a:cs typeface="Courier"/>
+              </a:rPr>
+              <a:t>        </a:t>
+            </a:r>
+            <a:r>
+              <a:rPr lang="en-US" sz="1200" dirty="0" err="1">
+                <a:latin typeface="Courier"/>
+                <a:cs typeface="Courier"/>
+              </a:rPr>
+              <a:t>self.viewModel.simpleObservable</a:t>
+            </a:r>
+            <a:r>
+              <a:rPr lang="en-US" sz="1200" dirty="0">
+                <a:latin typeface="Courier"/>
+                <a:cs typeface="Courier"/>
+              </a:rPr>
+              <a:t>()</a:t>
+            </a:r>
+          </a:p>
+          <a:p>
+            <a:r>
+              <a:rPr lang="en-US" sz="1200" dirty="0">
+                <a:latin typeface="Courier"/>
+                <a:cs typeface="Courier"/>
+              </a:rPr>
+              <a:t>            .</a:t>
+            </a:r>
+            <a:r>
+              <a:rPr lang="en-US" sz="1200" dirty="0" err="1">
+                <a:latin typeface="Courier"/>
+                <a:cs typeface="Courier"/>
+              </a:rPr>
+              <a:t>observeOn</a:t>
+            </a:r>
+            <a:r>
+              <a:rPr lang="en-US" sz="1200" dirty="0">
+                <a:latin typeface="Courier"/>
+                <a:cs typeface="Courier"/>
+              </a:rPr>
+              <a:t>(</a:t>
+            </a:r>
+            <a:r>
+              <a:rPr lang="en-US" sz="1200" dirty="0" err="1">
+                <a:latin typeface="Courier"/>
+                <a:cs typeface="Courier"/>
+              </a:rPr>
+              <a:t>MainScheduler.instance</a:t>
+            </a:r>
+            <a:r>
+              <a:rPr lang="en-US" sz="1200" dirty="0">
+                <a:latin typeface="Courier"/>
+                <a:cs typeface="Courier"/>
+              </a:rPr>
+              <a:t>)</a:t>
+            </a:r>
+          </a:p>
+          <a:p>
+            <a:r>
+              <a:rPr lang="en-US" sz="1200" dirty="0">
+                <a:latin typeface="Courier"/>
+                <a:cs typeface="Courier"/>
+              </a:rPr>
+              <a:t>            .</a:t>
+            </a:r>
+            <a:r>
+              <a:rPr lang="en-US" sz="1200" dirty="0" err="1">
+                <a:latin typeface="Courier"/>
+                <a:cs typeface="Courier"/>
+              </a:rPr>
+              <a:t>trackActivity</a:t>
+            </a:r>
+            <a:r>
+              <a:rPr lang="en-US" sz="1200" dirty="0">
+                <a:latin typeface="Courier"/>
+                <a:cs typeface="Courier"/>
+              </a:rPr>
+              <a:t>(</a:t>
+            </a:r>
+            <a:r>
+              <a:rPr lang="en-US" sz="1200" dirty="0" err="1">
+                <a:latin typeface="Courier"/>
+                <a:cs typeface="Courier"/>
+              </a:rPr>
+              <a:t>viewModel.signingInIndicator</a:t>
+            </a:r>
+            <a:r>
+              <a:rPr lang="en-US" sz="1200" dirty="0">
+                <a:latin typeface="Courier"/>
+                <a:cs typeface="Courier"/>
+              </a:rPr>
+              <a:t>)</a:t>
+            </a:r>
+          </a:p>
+          <a:p>
             <a:r>
               <a:rPr lang="mr-IN" sz="1200" dirty="0">
                 <a:latin typeface="Courier"/>
                 <a:cs typeface="Courier"/>
               </a:rPr>
-              <a:t>in</a:t>
+              <a:t>            .subscribe(onNext: { _ in</a:t>
+            </a:r>
+          </a:p>
+          <a:p>
+            <a:r>
+              <a:rPr lang="mr-IN" sz="1200" dirty="0">
+                <a:latin typeface="Courier"/>
+                <a:cs typeface="Courier"/>
+              </a:rPr>
+              <a:t>            })</a:t>
             </a:r>
           </a:p>
           <a:p>
@@ -8215,131 +8416,21 @@
                 <a:latin typeface="Courier"/>
                 <a:cs typeface="Courier"/>
               </a:rPr>
-              <a:t>                </a:t>
+              <a:t>            .disposed(by: </a:t>
             </a:r>
             <a:r>
               <a:rPr lang="en-US" sz="1200" dirty="0" err="1">
                 <a:latin typeface="Courier"/>
                 <a:cs typeface="Courier"/>
               </a:rPr>
-              <a:t>viewModel.simpleObservable</a:t>
+              <a:t>self.disposeBag</a:t>
             </a:r>
             <a:r>
               <a:rPr lang="en-US" sz="1200" dirty="0">
                 <a:latin typeface="Courier"/>
                 <a:cs typeface="Courier"/>
               </a:rPr>
-              <a:t>()</a:t>
-            </a:r>
-          </a:p>
-          <a:p>
-            <a:r>
-              <a:rPr lang="en-US" sz="1200" dirty="0">
-                <a:latin typeface="Courier"/>
-                <a:cs typeface="Courier"/>
-              </a:rPr>
-              <a:t>                    .</a:t>
-            </a:r>
-            <a:r>
-              <a:rPr lang="en-US" sz="1200" dirty="0" err="1">
-                <a:latin typeface="Courier"/>
-                <a:cs typeface="Courier"/>
-              </a:rPr>
-              <a:t>observeOn</a:t>
-            </a:r>
-            <a:r>
-              <a:rPr lang="en-US" sz="1200" dirty="0">
-                <a:latin typeface="Courier"/>
-                <a:cs typeface="Courier"/>
-              </a:rPr>
-              <a:t>(</a:t>
-            </a:r>
-            <a:r>
-              <a:rPr lang="en-US" sz="1200" dirty="0" err="1">
-                <a:latin typeface="Courier"/>
-                <a:cs typeface="Courier"/>
-              </a:rPr>
-              <a:t>MainScheduler.instance</a:t>
-            </a:r>
-            <a:r>
-              <a:rPr lang="en-US" sz="1200" dirty="0">
-                <a:latin typeface="Courier"/>
-                <a:cs typeface="Courier"/>
-              </a:rPr>
               <a:t>)</a:t>
-            </a:r>
-          </a:p>
-          <a:p>
-            <a:r>
-              <a:rPr lang="en-US" sz="1200" dirty="0">
-                <a:latin typeface="Courier"/>
-                <a:cs typeface="Courier"/>
-              </a:rPr>
-              <a:t>                    .</a:t>
-            </a:r>
-            <a:r>
-              <a:rPr lang="en-US" sz="1200" dirty="0" err="1">
-                <a:latin typeface="Courier"/>
-                <a:cs typeface="Courier"/>
-              </a:rPr>
-              <a:t>trackActivity</a:t>
-            </a:r>
-            <a:r>
-              <a:rPr lang="en-US" sz="1200" dirty="0">
-                <a:latin typeface="Courier"/>
-                <a:cs typeface="Courier"/>
-              </a:rPr>
-              <a:t>(</a:t>
-            </a:r>
-            <a:r>
-              <a:rPr lang="en-US" sz="1200" dirty="0" err="1">
-                <a:latin typeface="Courier"/>
-                <a:cs typeface="Courier"/>
-              </a:rPr>
-              <a:t>viewModel.signingInIndicator</a:t>
-            </a:r>
-            <a:r>
-              <a:rPr lang="en-US" sz="1200" dirty="0">
-                <a:latin typeface="Courier"/>
-                <a:cs typeface="Courier"/>
-              </a:rPr>
-              <a:t>)</a:t>
-            </a:r>
-          </a:p>
-          <a:p>
-            <a:r>
-              <a:rPr lang="mr-IN" sz="1200" dirty="0">
-                <a:latin typeface="Courier"/>
-                <a:cs typeface="Courier"/>
-              </a:rPr>
-              <a:t>                    .subscribe(onNext: { _ in</a:t>
-            </a:r>
-          </a:p>
-          <a:p>
-            <a:r>
-              <a:rPr lang="mr-IN" sz="1200" dirty="0">
-                <a:latin typeface="Courier"/>
-                <a:cs typeface="Courier"/>
-              </a:rPr>
-              <a:t>                    })</a:t>
-            </a:r>
-          </a:p>
-          <a:p>
-            <a:r>
-              <a:rPr lang="mr-IN" sz="1200" dirty="0">
-                <a:latin typeface="Courier"/>
-                <a:cs typeface="Courier"/>
-              </a:rPr>
-              <a:t>                    .disposed(by: self.disposeBag)</a:t>
-            </a:r>
-          </a:p>
-          <a:p>
-            <a:r>
-              <a:rPr lang="mr-IN" sz="1200" dirty="0">
-                <a:latin typeface="Courier"/>
-                <a:cs typeface="Courier"/>
-              </a:rPr>
-              <a:t>            }).disposed(by: disposeBag)</a:t>
             </a:r>
           </a:p>
           <a:p>

</xml_diff>